<commit_message>
Modify Test Image to UI
UI 제대로 그림
</commit_message>
<xml_diff>
--- a/보고서/작품 소개서/ToyGround_김영준_김동석.pptx
+++ b/보고서/작품 소개서/ToyGround_김영준_김동석.pptx
@@ -162,8 +162,8 @@
 <file path=ppt/revisionInfo.xml><?xml version="1.0" encoding="utf-8"?>
 <p1510:revInfo xmlns:a="http://schemas.openxmlformats.org/drawingml/2006/main" xmlns:r="http://schemas.openxmlformats.org/officeDocument/2006/relationships" xmlns:p1510="http://schemas.microsoft.com/office/powerpoint/2015/10/main">
   <p1510:revLst>
+    <p1510:client id="{0E979F68-A297-40CE-90E9-6CA309FCE206}" v="811" dt="2020-08-04T11:11:59.428"/>
     <p1510:client id="{8C6D05FC-103E-44F1-B02B-8266C9D399CE}" v="30" dt="2020-08-03T12:09:28.213"/>
-    <p1510:client id="{0E979F68-A297-40CE-90E9-6CA309FCE206}" v="811" dt="2020-08-04T11:11:59.428"/>
     <p1510:client id="{9D271469-D205-41C3-88A0-1E6E39E4B19D}" v="49" dt="2020-08-05T10:38:09.383"/>
     <p1510:client id="{FE72B99C-6761-4D5C-9D61-189F027C62FC}" v="36" dt="2020-08-05T08:59:33.659"/>
   </p1510:revLst>
@@ -1181,7 +1181,7 @@
                 <a:spcPct val="0"/>
               </a:spcBef>
             </a:pPr>
-            <a:endParaRPr lang="ko-KR" altLang="ko-KR"/>
+            <a:endParaRPr lang="ko-KR" altLang="ko-KR" dirty="0"/>
           </a:p>
         </p:txBody>
       </p:sp>
@@ -10434,7 +10434,7 @@
         </p:nvSpPr>
         <p:spPr bwMode="auto">
           <a:xfrm>
-            <a:off x="1301750" y="25609550"/>
+            <a:off x="2021682" y="25609550"/>
             <a:ext cx="4338638" cy="676349"/>
           </a:xfrm>
           <a:prstGeom prst="rect">
@@ -10607,13 +10607,27 @@
               <a:buNone/>
             </a:pPr>
             <a:r>
-              <a:rPr lang="en-US" altLang="ko-KR" sz="2500">
+              <a:rPr lang="ko-KR" altLang="en-US" sz="2500" dirty="0">
                 <a:latin typeface="맑은 고딕"/>
                 <a:ea typeface="맑은 고딕"/>
               </a:rPr>
-              <a:t>게임 화면</a:t>
-            </a:r>
-            <a:endParaRPr lang="en-US" altLang="ko-KR" sz="2500">
+              <a:t>개발</a:t>
+            </a:r>
+            <a:r>
+              <a:rPr lang="en-US" altLang="ko-KR" sz="2500" dirty="0">
+                <a:latin typeface="맑은 고딕"/>
+                <a:ea typeface="맑은 고딕"/>
+              </a:rPr>
+              <a:t> </a:t>
+            </a:r>
+            <a:r>
+              <a:rPr lang="ko-KR" altLang="en-US" sz="2500" dirty="0">
+                <a:latin typeface="맑은 고딕"/>
+                <a:ea typeface="맑은 고딕"/>
+              </a:rPr>
+              <a:t>과정</a:t>
+            </a:r>
+            <a:endParaRPr lang="en-US" altLang="ko-KR" sz="2500" dirty="0">
               <a:latin typeface="맑은 고딕" panose="020B0503020000020004" pitchFamily="50" charset="-127"/>
               <a:ea typeface="맑은 고딕" panose="020B0503020000020004" pitchFamily="50" charset="-127"/>
             </a:endParaRPr>
@@ -10636,7 +10650,7 @@
         </p:nvSpPr>
         <p:spPr bwMode="auto">
           <a:xfrm>
-            <a:off x="5838825" y="25682575"/>
+            <a:off x="7494290" y="24313802"/>
             <a:ext cx="5743575" cy="669925"/>
           </a:xfrm>
           <a:prstGeom prst="rect">
@@ -10813,7 +10827,7 @@
                 <a:latin typeface="맑은 고딕"/>
                 <a:ea typeface="맑은 고딕"/>
               </a:rPr>
-              <a:t>게임 플레이 화면</a:t>
+              <a:t>로그인 화면</a:t>
             </a:r>
             <a:endParaRPr lang="ko-KR" altLang="en-US" sz="2500" dirty="0">
               <a:latin typeface="맑은 고딕" panose="020B0503020000020004" pitchFamily="50" charset="-127"/>
@@ -10938,7 +10952,7 @@
         </p:nvSpPr>
         <p:spPr bwMode="auto">
           <a:xfrm>
-            <a:off x="5838825" y="25898475"/>
+            <a:off x="6001109" y="24514271"/>
             <a:ext cx="215900" cy="215900"/>
           </a:xfrm>
           <a:custGeom>
@@ -11024,195 +11038,6 @@
       </p:sp>
       <p:sp>
         <p:nvSpPr>
-          <p:cNvPr id="4137" name="Rectangle 247">
-            <a:extLst>
-              <a:ext uri="{FF2B5EF4-FFF2-40B4-BE49-F238E27FC236}">
-                <a16:creationId xmlns:a16="http://schemas.microsoft.com/office/drawing/2014/main" id="{246B77F0-5A41-4AFD-BECF-DEC7BE3AB6EB}"/>
-              </a:ext>
-            </a:extLst>
-          </p:cNvPr>
-          <p:cNvSpPr>
-            <a:spLocks noChangeArrowheads="1"/>
-          </p:cNvSpPr>
-          <p:nvPr/>
-        </p:nvSpPr>
-        <p:spPr bwMode="auto">
-          <a:xfrm>
-            <a:off x="12030075" y="8832850"/>
-            <a:ext cx="8713788" cy="6624638"/>
-          </a:xfrm>
-          <a:prstGeom prst="rect">
-            <a:avLst/>
-          </a:prstGeom>
-          <a:solidFill>
-            <a:srgbClr val="E6E6E7"/>
-          </a:solidFill>
-          <a:ln>
-            <a:noFill/>
-          </a:ln>
-          <a:extLst>
-            <a:ext uri="{91240B29-F687-4F45-9708-019B960494DF}">
-              <a14:hiddenLine xmlns:a14="http://schemas.microsoft.com/office/drawing/2010/main" w="9525">
-                <a:solidFill>
-                  <a:srgbClr val="000000"/>
-                </a:solidFill>
-                <a:miter lim="800000"/>
-                <a:headEnd/>
-                <a:tailEnd/>
-              </a14:hiddenLine>
-            </a:ext>
-          </a:extLst>
-        </p:spPr>
-        <p:txBody>
-          <a:bodyPr lIns="288808" tIns="144404" rIns="288808" bIns="144404"/>
-          <a:lstStyle>
-            <a:lvl1pPr defTabSz="2882900" latinLnBrk="1">
-              <a:spcBef>
-                <a:spcPct val="20000"/>
-              </a:spcBef>
-              <a:buChar char="•"/>
-              <a:defRPr kumimoji="1" sz="10400">
-                <a:solidFill>
-                  <a:schemeClr val="tx1"/>
-                </a:solidFill>
-                <a:latin typeface="굴림" panose="020B0600000101010101" pitchFamily="50" charset="-127"/>
-                <a:ea typeface="굴림" panose="020B0600000101010101" pitchFamily="50" charset="-127"/>
-              </a:defRPr>
-            </a:lvl1pPr>
-            <a:lvl2pPr marL="742950" indent="-285750" defTabSz="2882900" latinLnBrk="1">
-              <a:spcBef>
-                <a:spcPct val="20000"/>
-              </a:spcBef>
-              <a:buChar char="–"/>
-              <a:defRPr kumimoji="1" sz="9200">
-                <a:solidFill>
-                  <a:schemeClr val="tx1"/>
-                </a:solidFill>
-                <a:latin typeface="굴림" panose="020B0600000101010101" pitchFamily="50" charset="-127"/>
-                <a:ea typeface="굴림" panose="020B0600000101010101" pitchFamily="50" charset="-127"/>
-              </a:defRPr>
-            </a:lvl2pPr>
-            <a:lvl3pPr marL="1143000" indent="-228600" defTabSz="2882900" latinLnBrk="1">
-              <a:spcBef>
-                <a:spcPct val="20000"/>
-              </a:spcBef>
-              <a:buChar char="•"/>
-              <a:defRPr kumimoji="1" sz="7900">
-                <a:solidFill>
-                  <a:schemeClr val="tx1"/>
-                </a:solidFill>
-                <a:latin typeface="굴림" panose="020B0600000101010101" pitchFamily="50" charset="-127"/>
-                <a:ea typeface="굴림" panose="020B0600000101010101" pitchFamily="50" charset="-127"/>
-              </a:defRPr>
-            </a:lvl3pPr>
-            <a:lvl4pPr marL="1600200" indent="-228600" defTabSz="2882900" latinLnBrk="1">
-              <a:spcBef>
-                <a:spcPct val="20000"/>
-              </a:spcBef>
-              <a:buChar char="–"/>
-              <a:defRPr kumimoji="1" sz="6600">
-                <a:solidFill>
-                  <a:schemeClr val="tx1"/>
-                </a:solidFill>
-                <a:latin typeface="굴림" panose="020B0600000101010101" pitchFamily="50" charset="-127"/>
-                <a:ea typeface="굴림" panose="020B0600000101010101" pitchFamily="50" charset="-127"/>
-              </a:defRPr>
-            </a:lvl4pPr>
-            <a:lvl5pPr marL="2057400" indent="-228600" defTabSz="2882900" latinLnBrk="1">
-              <a:spcBef>
-                <a:spcPct val="20000"/>
-              </a:spcBef>
-              <a:buChar char="»"/>
-              <a:defRPr kumimoji="1" sz="6600">
-                <a:solidFill>
-                  <a:schemeClr val="tx1"/>
-                </a:solidFill>
-                <a:latin typeface="굴림" panose="020B0600000101010101" pitchFamily="50" charset="-127"/>
-                <a:ea typeface="굴림" panose="020B0600000101010101" pitchFamily="50" charset="-127"/>
-              </a:defRPr>
-            </a:lvl5pPr>
-            <a:lvl6pPr marL="2514600" indent="-228600" defTabSz="2882900" eaLnBrk="0" fontAlgn="base" hangingPunct="0">
-              <a:spcBef>
-                <a:spcPct val="20000"/>
-              </a:spcBef>
-              <a:spcAft>
-                <a:spcPct val="0"/>
-              </a:spcAft>
-              <a:buChar char="»"/>
-              <a:defRPr kumimoji="1" sz="6600">
-                <a:solidFill>
-                  <a:schemeClr val="tx1"/>
-                </a:solidFill>
-                <a:latin typeface="굴림" panose="020B0600000101010101" pitchFamily="50" charset="-127"/>
-                <a:ea typeface="굴림" panose="020B0600000101010101" pitchFamily="50" charset="-127"/>
-              </a:defRPr>
-            </a:lvl6pPr>
-            <a:lvl7pPr marL="2971800" indent="-228600" defTabSz="2882900" eaLnBrk="0" fontAlgn="base" hangingPunct="0">
-              <a:spcBef>
-                <a:spcPct val="20000"/>
-              </a:spcBef>
-              <a:spcAft>
-                <a:spcPct val="0"/>
-              </a:spcAft>
-              <a:buChar char="»"/>
-              <a:defRPr kumimoji="1" sz="6600">
-                <a:solidFill>
-                  <a:schemeClr val="tx1"/>
-                </a:solidFill>
-                <a:latin typeface="굴림" panose="020B0600000101010101" pitchFamily="50" charset="-127"/>
-                <a:ea typeface="굴림" panose="020B0600000101010101" pitchFamily="50" charset="-127"/>
-              </a:defRPr>
-            </a:lvl7pPr>
-            <a:lvl8pPr marL="3429000" indent="-228600" defTabSz="2882900" eaLnBrk="0" fontAlgn="base" hangingPunct="0">
-              <a:spcBef>
-                <a:spcPct val="20000"/>
-              </a:spcBef>
-              <a:spcAft>
-                <a:spcPct val="0"/>
-              </a:spcAft>
-              <a:buChar char="»"/>
-              <a:defRPr kumimoji="1" sz="6600">
-                <a:solidFill>
-                  <a:schemeClr val="tx1"/>
-                </a:solidFill>
-                <a:latin typeface="굴림" panose="020B0600000101010101" pitchFamily="50" charset="-127"/>
-                <a:ea typeface="굴림" panose="020B0600000101010101" pitchFamily="50" charset="-127"/>
-              </a:defRPr>
-            </a:lvl8pPr>
-            <a:lvl9pPr marL="3886200" indent="-228600" defTabSz="2882900" eaLnBrk="0" fontAlgn="base" hangingPunct="0">
-              <a:spcBef>
-                <a:spcPct val="20000"/>
-              </a:spcBef>
-              <a:spcAft>
-                <a:spcPct val="0"/>
-              </a:spcAft>
-              <a:buChar char="»"/>
-              <a:defRPr kumimoji="1" sz="6600">
-                <a:solidFill>
-                  <a:schemeClr val="tx1"/>
-                </a:solidFill>
-                <a:latin typeface="굴림" panose="020B0600000101010101" pitchFamily="50" charset="-127"/>
-                <a:ea typeface="굴림" panose="020B0600000101010101" pitchFamily="50" charset="-127"/>
-              </a:defRPr>
-            </a:lvl9pPr>
-          </a:lstStyle>
-          <a:p>
-            <a:pPr eaLnBrk="1" hangingPunct="1">
-              <a:spcBef>
-                <a:spcPct val="0"/>
-              </a:spcBef>
-              <a:buFontTx/>
-              <a:buNone/>
-            </a:pPr>
-            <a:endParaRPr kumimoji="0" lang="ko-KR" altLang="ko-KR" sz="5700">
-              <a:latin typeface="맑은 고딕" panose="020B0503020000020004" pitchFamily="50" charset="-127"/>
-              <a:ea typeface="맑은 고딕" panose="020B0503020000020004" pitchFamily="50" charset="-127"/>
-            </a:endParaRPr>
-          </a:p>
-        </p:txBody>
-      </p:sp>
-      <p:sp>
-        <p:nvSpPr>
           <p:cNvPr id="4138" name="TextBox 301">
             <a:extLst>
               <a:ext uri="{FF2B5EF4-FFF2-40B4-BE49-F238E27FC236}">
@@ -11227,7 +11052,7 @@
         </p:nvSpPr>
         <p:spPr bwMode="auto">
           <a:xfrm>
-            <a:off x="12534900" y="15889288"/>
+            <a:off x="12692062" y="15270315"/>
             <a:ext cx="7634288" cy="669925"/>
           </a:xfrm>
           <a:prstGeom prst="rect">
@@ -11418,7 +11243,7 @@
                 <a:latin typeface="맑은 고딕"/>
                 <a:ea typeface="맑은 고딕"/>
               </a:rPr>
-              <a:t>컨셉</a:t>
+              <a:t>화면</a:t>
             </a:r>
             <a:endParaRPr lang="en-US" altLang="ko-KR" sz="2500" dirty="0">
               <a:latin typeface="맑은 고딕"/>
@@ -11443,7 +11268,7 @@
         </p:nvSpPr>
         <p:spPr bwMode="auto">
           <a:xfrm>
-            <a:off x="12390438" y="16032163"/>
+            <a:off x="12390438" y="15384488"/>
             <a:ext cx="215900" cy="360362"/>
           </a:xfrm>
           <a:custGeom>
@@ -12181,8 +12006,8 @@
         </p:blipFill>
         <p:spPr>
           <a:xfrm>
-            <a:off x="918776" y="19394711"/>
-            <a:ext cx="4430796" cy="2470820"/>
+            <a:off x="498535" y="22607786"/>
+            <a:ext cx="5123850" cy="2857300"/>
           </a:xfrm>
           <a:prstGeom prst="rect">
             <a:avLst/>
@@ -12191,10 +12016,10 @@
       </p:pic>
       <p:pic>
         <p:nvPicPr>
-          <p:cNvPr id="6" name="그림 5">
+          <p:cNvPr id="5" name="그림 4">
             <a:extLst>
               <a:ext uri="{FF2B5EF4-FFF2-40B4-BE49-F238E27FC236}">
-                <a16:creationId xmlns:a16="http://schemas.microsoft.com/office/drawing/2014/main" id="{471ADA20-A956-4272-9C77-B1271D871988}"/>
+                <a16:creationId xmlns:a16="http://schemas.microsoft.com/office/drawing/2014/main" id="{36E2EC06-30BB-4F56-AF96-479659E30D0B}"/>
               </a:ext>
             </a:extLst>
           </p:cNvPr>
@@ -12204,15 +12029,21 @@
           <p:nvPr/>
         </p:nvPicPr>
         <p:blipFill>
-          <a:blip r:embed="rId5"/>
+          <a:blip r:embed="rId5">
+            <a:extLst>
+              <a:ext uri="{28A0092B-C50C-407E-A947-70E740481C1C}">
+                <a14:useLocalDpi xmlns:a14="http://schemas.microsoft.com/office/drawing/2010/main" val="0"/>
+              </a:ext>
+            </a:extLst>
+          </a:blip>
           <a:stretch>
             <a:fillRect/>
           </a:stretch>
         </p:blipFill>
         <p:spPr>
           <a:xfrm>
-            <a:off x="5529556" y="20418719"/>
-            <a:ext cx="6067484" cy="3559086"/>
+            <a:off x="11820572" y="9576208"/>
+            <a:ext cx="9858328" cy="5549645"/>
           </a:xfrm>
           <a:prstGeom prst="rect">
             <a:avLst/>
@@ -12221,10 +12052,10 @@
       </p:pic>
       <p:pic>
         <p:nvPicPr>
-          <p:cNvPr id="7" name="그림 6">
+          <p:cNvPr id="9" name="그림 8">
             <a:extLst>
               <a:ext uri="{FF2B5EF4-FFF2-40B4-BE49-F238E27FC236}">
-                <a16:creationId xmlns:a16="http://schemas.microsoft.com/office/drawing/2014/main" id="{82A6323A-A295-4FD7-B3AE-D1DD30BC1D8A}"/>
+                <a16:creationId xmlns:a16="http://schemas.microsoft.com/office/drawing/2014/main" id="{B44CC9B4-28F7-45B9-A74C-AC8ED2D4F470}"/>
               </a:ext>
             </a:extLst>
           </p:cNvPr>
@@ -12234,19 +12065,72 @@
           <p:nvPr/>
         </p:nvPicPr>
         <p:blipFill>
-          <a:blip r:embed="rId6"/>
+          <a:blip r:embed="rId6">
+            <a:extLst>
+              <a:ext uri="{28A0092B-C50C-407E-A947-70E740481C1C}">
+                <a14:useLocalDpi xmlns:a14="http://schemas.microsoft.com/office/drawing/2010/main" val="0"/>
+              </a:ext>
+            </a:extLst>
+          </a:blip>
           <a:stretch>
             <a:fillRect/>
           </a:stretch>
         </p:blipFill>
         <p:spPr>
           <a:xfrm>
-            <a:off x="857208" y="22282995"/>
-            <a:ext cx="4430796" cy="2599032"/>
+            <a:off x="5783954" y="20541283"/>
+            <a:ext cx="6112864" cy="3426836"/>
           </a:xfrm>
           <a:prstGeom prst="rect">
             <a:avLst/>
           </a:prstGeom>
+        </p:spPr>
+      </p:pic>
+      <p:pic>
+        <p:nvPicPr>
+          <p:cNvPr id="54" name="_x422379080" descr="EMB000062f41976">
+            <a:extLst>
+              <a:ext uri="{FF2B5EF4-FFF2-40B4-BE49-F238E27FC236}">
+                <a16:creationId xmlns:a16="http://schemas.microsoft.com/office/drawing/2014/main" id="{C41956CC-E538-43A7-B6DB-1F633007C5B7}"/>
+              </a:ext>
+            </a:extLst>
+          </p:cNvPr>
+          <p:cNvPicPr>
+            <a:picLocks noChangeAspect="1" noChangeArrowheads="1"/>
+          </p:cNvPicPr>
+          <p:nvPr/>
+        </p:nvPicPr>
+        <p:blipFill>
+          <a:blip r:embed="rId7">
+            <a:extLst>
+              <a:ext uri="{28A0092B-C50C-407E-A947-70E740481C1C}">
+                <a14:useLocalDpi xmlns:a14="http://schemas.microsoft.com/office/drawing/2010/main" val="0"/>
+              </a:ext>
+            </a:extLst>
+          </a:blip>
+          <a:srcRect/>
+          <a:stretch>
+            <a:fillRect/>
+          </a:stretch>
+        </p:blipFill>
+        <p:spPr bwMode="auto">
+          <a:xfrm>
+            <a:off x="526625" y="19242726"/>
+            <a:ext cx="5091962" cy="2982844"/>
+          </a:xfrm>
+          <a:prstGeom prst="rect">
+            <a:avLst/>
+          </a:prstGeom>
+          <a:noFill/>
+          <a:extLst>
+            <a:ext uri="{909E8E84-426E-40DD-AFC4-6F175D3DCCD1}">
+              <a14:hiddenFill xmlns:a14="http://schemas.microsoft.com/office/drawing/2010/main">
+                <a:solidFill>
+                  <a:srgbClr val="FFFFFF"/>
+                </a:solidFill>
+              </a14:hiddenFill>
+            </a:ext>
+          </a:extLst>
         </p:spPr>
       </p:pic>
     </p:spTree>
@@ -12254,6 +12138,81 @@
   <p:clrMapOvr>
     <a:masterClrMapping/>
   </p:clrMapOvr>
+  <p:timing>
+    <p:tnLst>
+      <p:par>
+        <p:cTn id="1" dur="indefinite" restart="never" nodeType="tmRoot">
+          <p:childTnLst>
+            <p:seq concurrent="1" nextAc="seek">
+              <p:cTn id="2" dur="indefinite" nodeType="mainSeq">
+                <p:childTnLst>
+                  <p:par>
+                    <p:cTn id="3" fill="hold">
+                      <p:stCondLst>
+                        <p:cond delay="indefinite"/>
+                      </p:stCondLst>
+                      <p:childTnLst>
+                        <p:par>
+                          <p:cTn id="4" fill="hold">
+                            <p:stCondLst>
+                              <p:cond delay="0"/>
+                            </p:stCondLst>
+                            <p:childTnLst>
+                              <p:par>
+                                <p:cTn id="5" presetID="1" presetClass="entr" presetSubtype="0" fill="hold" nodeType="clickEffect">
+                                  <p:stCondLst>
+                                    <p:cond delay="0"/>
+                                  </p:stCondLst>
+                                  <p:childTnLst>
+                                    <p:set>
+                                      <p:cBhvr>
+                                        <p:cTn id="6" dur="1" fill="hold">
+                                          <p:stCondLst>
+                                            <p:cond delay="0"/>
+                                          </p:stCondLst>
+                                        </p:cTn>
+                                        <p:tgtEl>
+                                          <p:spTgt spid="54"/>
+                                        </p:tgtEl>
+                                        <p:attrNameLst>
+                                          <p:attrName>style.visibility</p:attrName>
+                                        </p:attrNameLst>
+                                      </p:cBhvr>
+                                      <p:to>
+                                        <p:strVal val="visible"/>
+                                      </p:to>
+                                    </p:set>
+                                  </p:childTnLst>
+                                </p:cTn>
+                              </p:par>
+                            </p:childTnLst>
+                          </p:cTn>
+                        </p:par>
+                      </p:childTnLst>
+                    </p:cTn>
+                  </p:par>
+                </p:childTnLst>
+              </p:cTn>
+              <p:prevCondLst>
+                <p:cond evt="onPrev" delay="0">
+                  <p:tgtEl>
+                    <p:sldTgt/>
+                  </p:tgtEl>
+                </p:cond>
+              </p:prevCondLst>
+              <p:nextCondLst>
+                <p:cond evt="onNext" delay="0">
+                  <p:tgtEl>
+                    <p:sldTgt/>
+                  </p:tgtEl>
+                </p:cond>
+              </p:nextCondLst>
+            </p:seq>
+          </p:childTnLst>
+        </p:cTn>
+      </p:par>
+    </p:tnLst>
+  </p:timing>
 </p:sld>
 </file>
 

</xml_diff>